<commit_message>
Add some new pics and drafts
</commit_message>
<xml_diff>
--- a/Presentation_1212_JiayuChen.pptx
+++ b/Presentation_1212_JiayuChen.pptx
@@ -264,7 +264,7 @@
       <p15:sldGuideLst xmlns:p15="http://schemas.microsoft.com/office/powerpoint/2012/main"/>
     </p:ext>
     <p:ext uri="GoogleSlidesCustomDataVersion2">
-      <go:slidesCustomData xmlns="" xmlns:mc="http://schemas.openxmlformats.org/markup-compatibility/2006" xmlns:mv="urn:schemas-microsoft-com:mac:vml" xmlns:c="http://schemas.openxmlformats.org/drawingml/2006/chart" xmlns:dgm="http://schemas.openxmlformats.org/drawingml/2006/diagram" xmlns:o="urn:schemas-microsoft-com:office:office" xmlns:v="urn:schemas-microsoft-com:vml" xmlns:pvml="urn:schemas-microsoft-com:office:powerpoint" xmlns:com="http://schemas.openxmlformats.org/drawingml/2006/compatibility" xmlns:p14="http://schemas.microsoft.com/office/powerpoint/2010/main" xmlns:p15="http://schemas.microsoft.com/office/powerpoint/2012/main" xmlns:ahyp="http://schemas.microsoft.com/office/drawing/2018/hyperlinkcolor" xmlns:go="http://customooxmlschemas.google.com/" r:id="rId30" roundtripDataSignature="AMtx7mi7AOUiGfioVPTFrFzTi+gJGDXQ/w=="/>
+      <go:slidesCustomData xmlns:go="http://customooxmlschemas.google.com/" xmlns:ahyp="http://schemas.microsoft.com/office/drawing/2018/hyperlinkcolor" xmlns:p15="http://schemas.microsoft.com/office/powerpoint/2012/main" xmlns:p14="http://schemas.microsoft.com/office/powerpoint/2010/main" xmlns:com="http://schemas.openxmlformats.org/drawingml/2006/compatibility" xmlns:pvml="urn:schemas-microsoft-com:office:powerpoint" xmlns:v="urn:schemas-microsoft-com:vml" xmlns:o="urn:schemas-microsoft-com:office:office" xmlns:dgm="http://schemas.openxmlformats.org/drawingml/2006/diagram" xmlns:c="http://schemas.openxmlformats.org/drawingml/2006/chart" xmlns:mv="urn:schemas-microsoft-com:mac:vml" xmlns:mc="http://schemas.openxmlformats.org/markup-compatibility/2006" xmlns="" r:id="rId30" roundtripDataSignature="AMtx7mi7AOUiGfioVPTFrFzTi+gJGDXQ/w=="/>
     </p:ext>
   </p:extLst>
 </p:presentation>
@@ -21021,7 +21021,7 @@
         <p:spPr>
           <a:xfrm>
             <a:off x="609600" y="2451965"/>
-            <a:ext cx="9861030" cy="1785064"/>
+            <a:ext cx="9861030" cy="1569620"/>
           </a:xfrm>
           <a:prstGeom prst="rect">
             <a:avLst/>
@@ -21060,7 +21060,7 @@
             </a:r>
           </a:p>
           <a:p>
-            <a:pPr marL="342900" marR="0" lvl="0" indent="-342900" algn="l" rtl="0">
+            <a:pPr marL="457200" marR="0" lvl="0" indent="-457200" algn="l" rtl="0">
               <a:spcBef>
                 <a:spcPts val="0"/>
               </a:spcBef>
@@ -21070,7 +21070,7 @@
               <a:buAutoNum type="arabicPeriod"/>
             </a:pPr>
             <a:r>
-              <a:rPr lang="zh-CN" altLang="en-US" sz="1800" dirty="0">
+              <a:rPr lang="zh-CN" altLang="en-US" sz="2000" b="1" dirty="0">
                 <a:solidFill>
                   <a:schemeClr val="dk1"/>
                 </a:solidFill>
@@ -21079,10 +21079,30 @@
                 <a:cs typeface="Consolas"/>
                 <a:sym typeface="Consolas"/>
               </a:rPr>
-              <a:t>越是显著的特征（幅度大的峰或者谷）越是关注，从而会忽视小的</a:t>
+              <a:t>必须将单周期信号分解成足够多的分解量后，才能关注到较小的峰</a:t>
             </a:r>
+            <a:endParaRPr lang="en-US" altLang="zh-CN" sz="2000" b="1" dirty="0">
+              <a:solidFill>
+                <a:schemeClr val="dk1"/>
+              </a:solidFill>
+              <a:latin typeface="Consolas"/>
+              <a:ea typeface="Consolas"/>
+              <a:cs typeface="Consolas"/>
+              <a:sym typeface="Consolas"/>
+            </a:endParaRPr>
+          </a:p>
+          <a:p>
+            <a:pPr marL="457200" marR="0" lvl="0" indent="-457200" algn="l" rtl="0">
+              <a:spcBef>
+                <a:spcPts val="0"/>
+              </a:spcBef>
+              <a:spcAft>
+                <a:spcPts val="0"/>
+              </a:spcAft>
+              <a:buAutoNum type="arabicPeriod"/>
+            </a:pPr>
             <a:r>
-              <a:rPr lang="en-US" altLang="zh-CN" sz="1800" dirty="0">
+              <a:rPr lang="zh-CN" altLang="en-US" sz="2000" b="1" dirty="0">
                 <a:solidFill>
                   <a:schemeClr val="dk1"/>
                 </a:solidFill>
@@ -21091,140 +21111,9 @@
                 <a:cs typeface="Consolas"/>
                 <a:sym typeface="Consolas"/>
               </a:rPr>
-              <a:t>peak</a:t>
+              <a:t>经过分解后，各个分量之间比较混乱，分解过后已经没有可解释性了。</a:t>
             </a:r>
-          </a:p>
-          <a:p>
-            <a:pPr marL="342900" marR="0" lvl="0" indent="-342900" algn="l" rtl="0">
-              <a:spcBef>
-                <a:spcPts val="0"/>
-              </a:spcBef>
-              <a:spcAft>
-                <a:spcPts val="0"/>
-              </a:spcAft>
-              <a:buAutoNum type="arabicPeriod"/>
-            </a:pPr>
-            <a:r>
-              <a:rPr lang="zh-CN" altLang="en-US" sz="1800" dirty="0">
-                <a:solidFill>
-                  <a:schemeClr val="dk1"/>
-                </a:solidFill>
-                <a:latin typeface="Consolas"/>
-                <a:ea typeface="Consolas"/>
-                <a:cs typeface="Consolas"/>
-                <a:sym typeface="Consolas"/>
-              </a:rPr>
-              <a:t>算法能从一段信号中分解出的</a:t>
-            </a:r>
-            <a:r>
-              <a:rPr lang="en-US" altLang="zh-CN" sz="1800" dirty="0">
-                <a:solidFill>
-                  <a:schemeClr val="dk1"/>
-                </a:solidFill>
-                <a:latin typeface="Consolas"/>
-                <a:ea typeface="Consolas"/>
-                <a:cs typeface="Consolas"/>
-                <a:sym typeface="Consolas"/>
-              </a:rPr>
-              <a:t>components</a:t>
-            </a:r>
-            <a:r>
-              <a:rPr lang="zh-CN" altLang="en-US" sz="1800" dirty="0">
-                <a:solidFill>
-                  <a:schemeClr val="dk1"/>
-                </a:solidFill>
-                <a:latin typeface="Consolas"/>
-                <a:ea typeface="Consolas"/>
-                <a:cs typeface="Consolas"/>
-                <a:sym typeface="Consolas"/>
-              </a:rPr>
-              <a:t>的个数是有限的，对于我们的真实数据，最多是</a:t>
-            </a:r>
-            <a:r>
-              <a:rPr lang="en-US" altLang="zh-CN" sz="1800" dirty="0">
-                <a:solidFill>
-                  <a:schemeClr val="dk1"/>
-                </a:solidFill>
-                <a:latin typeface="Consolas"/>
-                <a:ea typeface="Consolas"/>
-                <a:cs typeface="Consolas"/>
-                <a:sym typeface="Consolas"/>
-              </a:rPr>
-              <a:t>4</a:t>
-            </a:r>
-            <a:r>
-              <a:rPr lang="zh-CN" altLang="en-US" sz="1800" dirty="0">
-                <a:solidFill>
-                  <a:schemeClr val="dk1"/>
-                </a:solidFill>
-                <a:latin typeface="Consolas"/>
-                <a:ea typeface="Consolas"/>
-                <a:cs typeface="Consolas"/>
-                <a:sym typeface="Consolas"/>
-              </a:rPr>
-              <a:t>，即使你摄者</a:t>
-            </a:r>
-            <a:r>
-              <a:rPr lang="en-US" altLang="zh-CN" sz="1800" dirty="0" err="1">
-                <a:solidFill>
-                  <a:schemeClr val="dk1"/>
-                </a:solidFill>
-                <a:latin typeface="Consolas"/>
-                <a:ea typeface="Consolas"/>
-                <a:cs typeface="Consolas"/>
-                <a:sym typeface="Consolas"/>
-              </a:rPr>
-              <a:t>n_components</a:t>
-            </a:r>
-            <a:r>
-              <a:rPr lang="en-US" altLang="zh-CN" sz="1800" dirty="0">
-                <a:solidFill>
-                  <a:schemeClr val="dk1"/>
-                </a:solidFill>
-                <a:latin typeface="Consolas"/>
-                <a:ea typeface="Consolas"/>
-                <a:cs typeface="Consolas"/>
-                <a:sym typeface="Consolas"/>
-              </a:rPr>
-              <a:t> &gt; 4, </a:t>
-            </a:r>
-            <a:r>
-              <a:rPr lang="zh-CN" altLang="en-US" sz="1800" dirty="0">
-                <a:solidFill>
-                  <a:schemeClr val="dk1"/>
-                </a:solidFill>
-                <a:latin typeface="Consolas"/>
-                <a:ea typeface="Consolas"/>
-                <a:cs typeface="Consolas"/>
-                <a:sym typeface="Consolas"/>
-              </a:rPr>
-              <a:t>依然分解出</a:t>
-            </a:r>
-            <a:r>
-              <a:rPr lang="en-US" altLang="zh-CN" sz="1800" dirty="0">
-                <a:solidFill>
-                  <a:schemeClr val="dk1"/>
-                </a:solidFill>
-                <a:latin typeface="Consolas"/>
-                <a:ea typeface="Consolas"/>
-                <a:cs typeface="Consolas"/>
-                <a:sym typeface="Consolas"/>
-              </a:rPr>
-              <a:t>4</a:t>
-            </a:r>
-            <a:r>
-              <a:rPr lang="zh-CN" altLang="en-US" sz="1800" dirty="0">
-                <a:solidFill>
-                  <a:schemeClr val="dk1"/>
-                </a:solidFill>
-                <a:latin typeface="Consolas"/>
-                <a:ea typeface="Consolas"/>
-                <a:cs typeface="Consolas"/>
-                <a:sym typeface="Consolas"/>
-              </a:rPr>
-              <a:t>个。</a:t>
-            </a:r>
-            <a:endParaRPr lang="en-US" altLang="zh-CN" sz="1800" dirty="0">
+            <a:endParaRPr lang="en-US" altLang="zh-CN" sz="2000" b="1" dirty="0">
               <a:solidFill>
                 <a:schemeClr val="dk1"/>
               </a:solidFill>
@@ -21364,6 +21253,126 @@
           </a:p>
         </p:txBody>
       </p:sp>
+      <p:pic>
+        <p:nvPicPr>
+          <p:cNvPr id="3" name="图片 2">
+            <a:extLst>
+              <a:ext uri="{FF2B5EF4-FFF2-40B4-BE49-F238E27FC236}">
+                <a16:creationId xmlns:a16="http://schemas.microsoft.com/office/drawing/2014/main" id="{65F3FB5C-7647-2E11-799E-E8A897B027D8}"/>
+              </a:ext>
+            </a:extLst>
+          </p:cNvPr>
+          <p:cNvPicPr>
+            <a:picLocks noChangeAspect="1"/>
+          </p:cNvPicPr>
+          <p:nvPr/>
+        </p:nvPicPr>
+        <p:blipFill>
+          <a:blip r:embed="rId3"/>
+          <a:stretch>
+            <a:fillRect/>
+          </a:stretch>
+        </p:blipFill>
+        <p:spPr>
+          <a:xfrm>
+            <a:off x="2978943" y="1395412"/>
+            <a:ext cx="6234113" cy="4067175"/>
+          </a:xfrm>
+          <a:prstGeom prst="rect">
+            <a:avLst/>
+          </a:prstGeom>
+        </p:spPr>
+      </p:pic>
+      <p:pic>
+        <p:nvPicPr>
+          <p:cNvPr id="5" name="图片 4">
+            <a:extLst>
+              <a:ext uri="{FF2B5EF4-FFF2-40B4-BE49-F238E27FC236}">
+                <a16:creationId xmlns:a16="http://schemas.microsoft.com/office/drawing/2014/main" id="{F3DE8524-0DF2-D4B0-C537-D383018B52AC}"/>
+              </a:ext>
+            </a:extLst>
+          </p:cNvPr>
+          <p:cNvPicPr>
+            <a:picLocks noChangeAspect="1"/>
+          </p:cNvPicPr>
+          <p:nvPr/>
+        </p:nvPicPr>
+        <p:blipFill>
+          <a:blip r:embed="rId4"/>
+          <a:stretch>
+            <a:fillRect/>
+          </a:stretch>
+        </p:blipFill>
+        <p:spPr>
+          <a:xfrm>
+            <a:off x="2357418" y="1550175"/>
+            <a:ext cx="7777163" cy="4057650"/>
+          </a:xfrm>
+          <a:prstGeom prst="rect">
+            <a:avLst/>
+          </a:prstGeom>
+        </p:spPr>
+      </p:pic>
+      <p:pic>
+        <p:nvPicPr>
+          <p:cNvPr id="7" name="图片 6">
+            <a:extLst>
+              <a:ext uri="{FF2B5EF4-FFF2-40B4-BE49-F238E27FC236}">
+                <a16:creationId xmlns:a16="http://schemas.microsoft.com/office/drawing/2014/main" id="{B239EBEF-50B5-E376-632D-9463DAEA86AF}"/>
+              </a:ext>
+            </a:extLst>
+          </p:cNvPr>
+          <p:cNvPicPr>
+            <a:picLocks noChangeAspect="1"/>
+          </p:cNvPicPr>
+          <p:nvPr/>
+        </p:nvPicPr>
+        <p:blipFill>
+          <a:blip r:embed="rId5"/>
+          <a:stretch>
+            <a:fillRect/>
+          </a:stretch>
+        </p:blipFill>
+        <p:spPr>
+          <a:xfrm>
+            <a:off x="3362287" y="1700175"/>
+            <a:ext cx="6067425" cy="4057650"/>
+          </a:xfrm>
+          <a:prstGeom prst="rect">
+            <a:avLst/>
+          </a:prstGeom>
+        </p:spPr>
+      </p:pic>
+      <p:pic>
+        <p:nvPicPr>
+          <p:cNvPr id="9" name="图片 8">
+            <a:extLst>
+              <a:ext uri="{FF2B5EF4-FFF2-40B4-BE49-F238E27FC236}">
+                <a16:creationId xmlns:a16="http://schemas.microsoft.com/office/drawing/2014/main" id="{124A94D5-772E-FE6D-2958-6D64836E3E17}"/>
+              </a:ext>
+            </a:extLst>
+          </p:cNvPr>
+          <p:cNvPicPr>
+            <a:picLocks noChangeAspect="1"/>
+          </p:cNvPicPr>
+          <p:nvPr/>
+        </p:nvPicPr>
+        <p:blipFill>
+          <a:blip r:embed="rId6"/>
+          <a:stretch>
+            <a:fillRect/>
+          </a:stretch>
+        </p:blipFill>
+        <p:spPr>
+          <a:xfrm>
+            <a:off x="3512287" y="1840650"/>
+            <a:ext cx="6067425" cy="4076700"/>
+          </a:xfrm>
+          <a:prstGeom prst="rect">
+            <a:avLst/>
+          </a:prstGeom>
+        </p:spPr>
+      </p:pic>
     </p:spTree>
     <p:extLst>
       <p:ext uri="{BB962C8B-B14F-4D97-AF65-F5344CB8AC3E}">
@@ -21482,8 +21491,8 @@
         </p:nvSpPr>
         <p:spPr>
           <a:xfrm>
-            <a:off x="609600" y="106251"/>
-            <a:ext cx="4584920" cy="369332"/>
+            <a:off x="0" y="0"/>
+            <a:ext cx="5141119" cy="369291"/>
           </a:xfrm>
           <a:prstGeom prst="rect">
             <a:avLst/>
@@ -21509,7 +21518,7 @@
               <a:buNone/>
             </a:pPr>
             <a:r>
-              <a:rPr lang="en-US" sz="1800" b="1">
+              <a:rPr lang="en-US" altLang="zh-CN" sz="1800" b="1" dirty="0">
                 <a:solidFill>
                   <a:schemeClr val="dk1"/>
                 </a:solidFill>
@@ -21518,17 +21527,9 @@
                 <a:cs typeface="Consolas"/>
                 <a:sym typeface="Consolas"/>
               </a:rPr>
-              <a:t>Analysis of Experimental Results</a:t>
+              <a:t>An easy experiment about sampling rate.</a:t>
             </a:r>
-            <a:endParaRPr sz="1100" b="1">
-              <a:solidFill>
-                <a:schemeClr val="dk1"/>
-              </a:solidFill>
-              <a:latin typeface="Consolas"/>
-              <a:ea typeface="Consolas"/>
-              <a:cs typeface="Consolas"/>
-              <a:sym typeface="Consolas"/>
-            </a:endParaRPr>
+            <a:endParaRPr lang="en-US" altLang="zh-CN" sz="1800" b="1" dirty="0"/>
           </a:p>
         </p:txBody>
       </p:sp>
@@ -21539,14 +21540,14 @@
           <p:nvPr>
             <p:extLst>
               <p:ext uri="{D42A27DB-BD31-4B8C-83A1-F6EECF244321}">
-                <p14:modId xmlns:p14="http://schemas.microsoft.com/office/powerpoint/2010/main" val="1363218290"/>
+                <p14:modId xmlns:p14="http://schemas.microsoft.com/office/powerpoint/2010/main" val="752457277"/>
               </p:ext>
             </p:extLst>
           </p:nvPr>
         </p:nvGraphicFramePr>
         <p:xfrm>
-          <a:off x="1375447" y="1203900"/>
-          <a:ext cx="8492012" cy="2961720"/>
+          <a:off x="1109315" y="3317813"/>
+          <a:ext cx="9369899" cy="1849170"/>
         </p:xfrm>
         <a:graphic>
           <a:graphicData uri="http://schemas.openxmlformats.org/drawingml/2006/table">
@@ -21577,7 +21578,7 @@
                     </a:ext>
                   </a:extLst>
                 </a:gridCol>
-                <a:gridCol w="1311613">
+                <a:gridCol w="2189500">
                   <a:extLst>
                     <a:ext uri="{9D8B030D-6E8A-4147-A177-3AD203B41FA5}">
                       <a16:colId xmlns:a16="http://schemas.microsoft.com/office/drawing/2014/main" val="3073676540"/>
@@ -21685,7 +21686,11 @@
                       </a:pPr>
                       <a:r>
                         <a:rPr lang="en-US" sz="1800" u="none" strike="noStrike" cap="none" dirty="0"/>
-                        <a:t>Resample</a:t>
+                        <a:t>Resample </a:t>
+                      </a:r>
+                      <a:r>
+                        <a:rPr lang="en-US" altLang="zh-CN" sz="1800" u="none" strike="noStrike" cap="none" dirty="0"/>
+                        <a:t>Method</a:t>
                       </a:r>
                       <a:endParaRPr sz="1800" u="none" strike="noStrike" cap="none" dirty="0"/>
                     </a:p>
@@ -21989,6 +21994,992 @@
                     <a:bodyPr/>
                     <a:lstStyle/>
                     <a:p>
+                      <a:pPr marL="0" marR="0" lvl="0" indent="0" algn="ctr" defTabSz="914400" rtl="0" eaLnBrk="1" fontAlgn="auto" latinLnBrk="0" hangingPunct="1">
+                        <a:lnSpc>
+                          <a:spcPct val="100000"/>
+                        </a:lnSpc>
+                        <a:spcBef>
+                          <a:spcPts val="0"/>
+                        </a:spcBef>
+                        <a:spcAft>
+                          <a:spcPts val="0"/>
+                        </a:spcAft>
+                        <a:buClr>
+                          <a:schemeClr val="dk1"/>
+                        </a:buClr>
+                        <a:buSzPts val="1800"/>
+                        <a:buFont typeface="Consolas"/>
+                        <a:buNone/>
+                        <a:tabLst/>
+                        <a:defRPr/>
+                      </a:pPr>
+                      <a:r>
+                        <a:rPr lang="en-US" altLang="zh-CN" sz="1800" u="none" strike="noStrike" cap="none" dirty="0"/>
+                        <a:t>100-&gt;200</a:t>
+                      </a:r>
+                    </a:p>
+                  </a:txBody>
+                  <a:tcPr marL="91450" marR="91450" marT="45725" marB="45725"/>
+                </a:tc>
+                <a:tc>
+                  <a:txBody>
+                    <a:bodyPr/>
+                    <a:lstStyle/>
+                    <a:p>
+                      <a:pPr marL="0" marR="0" lvl="0" indent="0" algn="ctr" rtl="0">
+                        <a:lnSpc>
+                          <a:spcPct val="100000"/>
+                        </a:lnSpc>
+                        <a:spcBef>
+                          <a:spcPts val="0"/>
+                        </a:spcBef>
+                        <a:spcAft>
+                          <a:spcPts val="0"/>
+                        </a:spcAft>
+                        <a:buClr>
+                          <a:schemeClr val="dk1"/>
+                        </a:buClr>
+                        <a:buSzPts val="1800"/>
+                        <a:buFont typeface="Consolas"/>
+                        <a:buNone/>
+                      </a:pPr>
+                      <a:r>
+                        <a:rPr lang="en-US" sz="1800" u="none" strike="noStrike" cap="none" dirty="0"/>
+                        <a:t>FFT</a:t>
+                      </a:r>
+                      <a:endParaRPr sz="1800" u="none" strike="noStrike" cap="none" dirty="0"/>
+                    </a:p>
+                  </a:txBody>
+                  <a:tcPr marL="91450" marR="91450" marT="45725" marB="45725"/>
+                </a:tc>
+                <a:tc>
+                  <a:txBody>
+                    <a:bodyPr/>
+                    <a:lstStyle/>
+                    <a:p>
+                      <a:pPr marL="0" marR="0" lvl="0" indent="0" algn="ctr" rtl="0">
+                        <a:lnSpc>
+                          <a:spcPct val="100000"/>
+                        </a:lnSpc>
+                        <a:spcBef>
+                          <a:spcPts val="0"/>
+                        </a:spcBef>
+                        <a:spcAft>
+                          <a:spcPts val="0"/>
+                        </a:spcAft>
+                        <a:buClr>
+                          <a:schemeClr val="dk1"/>
+                        </a:buClr>
+                        <a:buSzPts val="1800"/>
+                        <a:buFont typeface="Consolas"/>
+                        <a:buNone/>
+                      </a:pPr>
+                      <a:r>
+                        <a:rPr lang="en-US" sz="1800" u="none" strike="noStrike" cap="none" dirty="0"/>
+                        <a:t>0.70</a:t>
+                      </a:r>
+                      <a:endParaRPr sz="1800" u="none" strike="noStrike" cap="none" dirty="0"/>
+                    </a:p>
+                  </a:txBody>
+                  <a:tcPr marL="91450" marR="91450" marT="45725" marB="45725"/>
+                </a:tc>
+                <a:tc>
+                  <a:txBody>
+                    <a:bodyPr/>
+                    <a:lstStyle/>
+                    <a:p>
+                      <a:pPr marL="0" marR="0" lvl="0" indent="0" algn="ctr" rtl="0">
+                        <a:lnSpc>
+                          <a:spcPct val="100000"/>
+                        </a:lnSpc>
+                        <a:spcBef>
+                          <a:spcPts val="0"/>
+                        </a:spcBef>
+                        <a:spcAft>
+                          <a:spcPts val="0"/>
+                        </a:spcAft>
+                        <a:buClr>
+                          <a:schemeClr val="dk1"/>
+                        </a:buClr>
+                        <a:buSzPts val="1800"/>
+                        <a:buFont typeface="Consolas"/>
+                        <a:buNone/>
+                      </a:pPr>
+                      <a:r>
+                        <a:rPr lang="en-US" sz="1800" u="none" strike="noStrike" cap="none" dirty="0"/>
+                        <a:t>2.47</a:t>
+                      </a:r>
+                      <a:endParaRPr sz="1800" u="none" strike="noStrike" cap="none" dirty="0"/>
+                    </a:p>
+                  </a:txBody>
+                  <a:tcPr marL="91450" marR="91450" marT="45725" marB="45725"/>
+                </a:tc>
+                <a:extLst>
+                  <a:ext uri="{0D108BD9-81ED-4DB2-BD59-A6C34878D82A}">
+                    <a16:rowId xmlns:a16="http://schemas.microsoft.com/office/drawing/2014/main" val="2956886552"/>
+                  </a:ext>
+                </a:extLst>
+              </a:tr>
+              <a:tr h="370850">
+                <a:tc>
+                  <a:txBody>
+                    <a:bodyPr/>
+                    <a:lstStyle/>
+                    <a:p>
+                      <a:pPr marL="0" marR="0" lvl="0" indent="0" algn="ctr" rtl="0">
+                        <a:spcBef>
+                          <a:spcPts val="0"/>
+                        </a:spcBef>
+                        <a:spcAft>
+                          <a:spcPts val="0"/>
+                        </a:spcAft>
+                        <a:buNone/>
+                      </a:pPr>
+                      <a:r>
+                        <a:rPr lang="en-US" sz="1800" u="none" strike="noStrike" cap="none" dirty="0"/>
+                        <a:t>Template: Mean</a:t>
+                      </a:r>
+                      <a:endParaRPr dirty="0"/>
+                    </a:p>
+                  </a:txBody>
+                  <a:tcPr marL="91450" marR="91450" marT="45725" marB="45725"/>
+                </a:tc>
+                <a:tc>
+                  <a:txBody>
+                    <a:bodyPr/>
+                    <a:lstStyle/>
+                    <a:p>
+                      <a:pPr marL="0" marR="0" lvl="0" indent="0" algn="ctr" rtl="0">
+                        <a:lnSpc>
+                          <a:spcPct val="100000"/>
+                        </a:lnSpc>
+                        <a:spcBef>
+                          <a:spcPts val="0"/>
+                        </a:spcBef>
+                        <a:spcAft>
+                          <a:spcPts val="0"/>
+                        </a:spcAft>
+                        <a:buClr>
+                          <a:schemeClr val="dk1"/>
+                        </a:buClr>
+                        <a:buSzPts val="1800"/>
+                        <a:buFont typeface="Consolas"/>
+                        <a:buNone/>
+                      </a:pPr>
+                      <a:r>
+                        <a:rPr lang="en-US" sz="1800" u="none" strike="noStrike" cap="none" dirty="0"/>
+                        <a:t>Simulation</a:t>
+                      </a:r>
+                      <a:endParaRPr sz="1800" u="none" strike="noStrike" cap="none" dirty="0"/>
+                    </a:p>
+                  </a:txBody>
+                  <a:tcPr marL="91450" marR="91450" marT="45725" marB="45725"/>
+                </a:tc>
+                <a:tc>
+                  <a:txBody>
+                    <a:bodyPr/>
+                    <a:lstStyle/>
+                    <a:p>
+                      <a:pPr marL="0" marR="0" lvl="0" indent="0" algn="ctr" defTabSz="914400" rtl="0" eaLnBrk="1" fontAlgn="auto" latinLnBrk="0" hangingPunct="1">
+                        <a:lnSpc>
+                          <a:spcPct val="100000"/>
+                        </a:lnSpc>
+                        <a:spcBef>
+                          <a:spcPts val="0"/>
+                        </a:spcBef>
+                        <a:spcAft>
+                          <a:spcPts val="0"/>
+                        </a:spcAft>
+                        <a:buClr>
+                          <a:schemeClr val="dk1"/>
+                        </a:buClr>
+                        <a:buSzPts val="1800"/>
+                        <a:buFont typeface="Consolas"/>
+                        <a:buNone/>
+                        <a:tabLst/>
+                        <a:defRPr/>
+                      </a:pPr>
+                      <a:r>
+                        <a:rPr lang="en-US" altLang="zh-CN" sz="1800" u="none" strike="noStrike" cap="none" dirty="0"/>
+                        <a:t>100-&gt;200</a:t>
+                      </a:r>
+                    </a:p>
+                  </a:txBody>
+                  <a:tcPr marL="91450" marR="91450" marT="45725" marB="45725"/>
+                </a:tc>
+                <a:tc>
+                  <a:txBody>
+                    <a:bodyPr/>
+                    <a:lstStyle/>
+                    <a:p>
+                      <a:pPr marL="0" marR="0" lvl="0" indent="0" algn="ctr" rtl="0">
+                        <a:lnSpc>
+                          <a:spcPct val="100000"/>
+                        </a:lnSpc>
+                        <a:spcBef>
+                          <a:spcPts val="0"/>
+                        </a:spcBef>
+                        <a:spcAft>
+                          <a:spcPts val="0"/>
+                        </a:spcAft>
+                        <a:buClr>
+                          <a:schemeClr val="dk1"/>
+                        </a:buClr>
+                        <a:buSzPts val="1800"/>
+                        <a:buFont typeface="Consolas"/>
+                        <a:buNone/>
+                      </a:pPr>
+                      <a:r>
+                        <a:rPr lang="en-US" sz="1800" u="none" strike="noStrike" cap="none" dirty="0"/>
+                        <a:t>POLY</a:t>
+                      </a:r>
+                      <a:endParaRPr sz="1800" u="none" strike="noStrike" cap="none" dirty="0"/>
+                    </a:p>
+                  </a:txBody>
+                  <a:tcPr marL="91450" marR="91450" marT="45725" marB="45725"/>
+                </a:tc>
+                <a:tc>
+                  <a:txBody>
+                    <a:bodyPr/>
+                    <a:lstStyle/>
+                    <a:p>
+                      <a:pPr marL="0" marR="0" lvl="0" indent="0" algn="ctr" rtl="0">
+                        <a:lnSpc>
+                          <a:spcPct val="100000"/>
+                        </a:lnSpc>
+                        <a:spcBef>
+                          <a:spcPts val="0"/>
+                        </a:spcBef>
+                        <a:spcAft>
+                          <a:spcPts val="0"/>
+                        </a:spcAft>
+                        <a:buClr>
+                          <a:schemeClr val="dk1"/>
+                        </a:buClr>
+                        <a:buSzPts val="1800"/>
+                        <a:buFont typeface="Consolas"/>
+                        <a:buNone/>
+                      </a:pPr>
+                      <a:r>
+                        <a:rPr lang="en-US" sz="1800" b="1" u="sng" strike="noStrike" cap="none" dirty="0"/>
+                        <a:t>0.64</a:t>
+                      </a:r>
+                      <a:endParaRPr sz="1800" b="1" u="sng" strike="noStrike" cap="none" dirty="0"/>
+                    </a:p>
+                  </a:txBody>
+                  <a:tcPr marL="91450" marR="91450" marT="45725" marB="45725"/>
+                </a:tc>
+                <a:tc>
+                  <a:txBody>
+                    <a:bodyPr/>
+                    <a:lstStyle/>
+                    <a:p>
+                      <a:pPr marL="0" marR="0" lvl="0" indent="0" algn="ctr" rtl="0">
+                        <a:lnSpc>
+                          <a:spcPct val="100000"/>
+                        </a:lnSpc>
+                        <a:spcBef>
+                          <a:spcPts val="0"/>
+                        </a:spcBef>
+                        <a:spcAft>
+                          <a:spcPts val="0"/>
+                        </a:spcAft>
+                        <a:buClr>
+                          <a:schemeClr val="dk1"/>
+                        </a:buClr>
+                        <a:buSzPts val="1800"/>
+                        <a:buFont typeface="Consolas"/>
+                        <a:buNone/>
+                      </a:pPr>
+                      <a:r>
+                        <a:rPr lang="en-US" sz="1800" u="none" strike="noStrike" cap="none" dirty="0"/>
+                        <a:t>2.07</a:t>
+                      </a:r>
+                      <a:endParaRPr sz="1800" u="none" strike="noStrike" cap="none" dirty="0"/>
+                    </a:p>
+                  </a:txBody>
+                  <a:tcPr marL="91450" marR="91450" marT="45725" marB="45725"/>
+                </a:tc>
+                <a:extLst>
+                  <a:ext uri="{0D108BD9-81ED-4DB2-BD59-A6C34878D82A}">
+                    <a16:rowId xmlns:a16="http://schemas.microsoft.com/office/drawing/2014/main" val="4028608685"/>
+                  </a:ext>
+                </a:extLst>
+              </a:tr>
+              <a:tr h="231823">
+                <a:tc>
+                  <a:txBody>
+                    <a:bodyPr/>
+                    <a:lstStyle/>
+                    <a:p>
+                      <a:pPr marL="0" marR="0" lvl="0" indent="0" algn="ctr" rtl="0">
+                        <a:spcBef>
+                          <a:spcPts val="0"/>
+                        </a:spcBef>
+                        <a:spcAft>
+                          <a:spcPts val="0"/>
+                        </a:spcAft>
+                        <a:buNone/>
+                      </a:pPr>
+                      <a:r>
+                        <a:rPr lang="en-US" sz="1800" u="none" strike="noStrike" cap="none" dirty="0"/>
+                        <a:t>Template: Mean</a:t>
+                      </a:r>
+                      <a:endParaRPr dirty="0"/>
+                    </a:p>
+                  </a:txBody>
+                  <a:tcPr marL="91450" marR="91450" marT="45725" marB="45725"/>
+                </a:tc>
+                <a:tc>
+                  <a:txBody>
+                    <a:bodyPr/>
+                    <a:lstStyle/>
+                    <a:p>
+                      <a:pPr marL="0" marR="0" lvl="0" indent="0" algn="ctr" rtl="0">
+                        <a:spcBef>
+                          <a:spcPts val="0"/>
+                        </a:spcBef>
+                        <a:spcAft>
+                          <a:spcPts val="0"/>
+                        </a:spcAft>
+                        <a:buNone/>
+                      </a:pPr>
+                      <a:r>
+                        <a:rPr lang="en-US" altLang="zh-CN" sz="1800" u="none" strike="noStrike" cap="none" dirty="0"/>
+                        <a:t>Simulation</a:t>
+                      </a:r>
+                      <a:endParaRPr sz="1800" u="none" strike="noStrike" cap="none" dirty="0"/>
+                    </a:p>
+                  </a:txBody>
+                  <a:tcPr marL="91450" marR="91450" marT="45725" marB="45725"/>
+                </a:tc>
+                <a:tc>
+                  <a:txBody>
+                    <a:bodyPr/>
+                    <a:lstStyle/>
+                    <a:p>
+                      <a:pPr marL="0" marR="0" lvl="0" indent="0" algn="ctr" rtl="0">
+                        <a:spcBef>
+                          <a:spcPts val="0"/>
+                        </a:spcBef>
+                        <a:spcAft>
+                          <a:spcPts val="0"/>
+                        </a:spcAft>
+                        <a:buNone/>
+                      </a:pPr>
+                      <a:r>
+                        <a:rPr lang="en-US" sz="1800" u="none" strike="noStrike" cap="none" dirty="0"/>
+                        <a:t>200</a:t>
+                      </a:r>
+                      <a:endParaRPr sz="1800" u="none" strike="noStrike" cap="none" dirty="0"/>
+                    </a:p>
+                  </a:txBody>
+                  <a:tcPr marL="91450" marR="91450" marT="45725" marB="45725"/>
+                </a:tc>
+                <a:tc>
+                  <a:txBody>
+                    <a:bodyPr/>
+                    <a:lstStyle/>
+                    <a:p>
+                      <a:pPr marL="0" marR="0" lvl="0" indent="0" algn="ctr" rtl="0">
+                        <a:spcBef>
+                          <a:spcPts val="0"/>
+                        </a:spcBef>
+                        <a:spcAft>
+                          <a:spcPts val="0"/>
+                        </a:spcAft>
+                        <a:buNone/>
+                      </a:pPr>
+                      <a:r>
+                        <a:rPr lang="en-US" sz="1800" u="none" strike="noStrike" cap="none" dirty="0"/>
+                        <a:t>-</a:t>
+                      </a:r>
+                      <a:endParaRPr sz="1800" u="none" strike="noStrike" cap="none" dirty="0"/>
+                    </a:p>
+                  </a:txBody>
+                  <a:tcPr marL="91450" marR="91450" marT="45725" marB="45725"/>
+                </a:tc>
+                <a:tc>
+                  <a:txBody>
+                    <a:bodyPr/>
+                    <a:lstStyle/>
+                    <a:p>
+                      <a:pPr marL="0" marR="0" lvl="0" indent="0" algn="ctr" rtl="0">
+                        <a:spcBef>
+                          <a:spcPts val="0"/>
+                        </a:spcBef>
+                        <a:spcAft>
+                          <a:spcPts val="0"/>
+                        </a:spcAft>
+                        <a:buNone/>
+                      </a:pPr>
+                      <a:r>
+                        <a:rPr lang="en-US" sz="1800" u="none" strike="noStrike" cap="none" dirty="0"/>
+                        <a:t>0.65</a:t>
+                      </a:r>
+                      <a:endParaRPr sz="1800" u="none" strike="noStrike" cap="none" dirty="0"/>
+                    </a:p>
+                  </a:txBody>
+                  <a:tcPr marL="91450" marR="91450" marT="45725" marB="45725"/>
+                </a:tc>
+                <a:tc>
+                  <a:txBody>
+                    <a:bodyPr/>
+                    <a:lstStyle/>
+                    <a:p>
+                      <a:pPr marL="0" marR="0" lvl="0" indent="0" algn="ctr" rtl="0">
+                        <a:spcBef>
+                          <a:spcPts val="0"/>
+                        </a:spcBef>
+                        <a:spcAft>
+                          <a:spcPts val="0"/>
+                        </a:spcAft>
+                        <a:buNone/>
+                      </a:pPr>
+                      <a:r>
+                        <a:rPr lang="en-US" sz="1800" b="1" i="0" u="sng" strike="noStrike" cap="none" dirty="0"/>
+                        <a:t>1.75</a:t>
+                      </a:r>
+                      <a:endParaRPr sz="1800" b="1" i="0" u="sng" strike="noStrike" cap="none" dirty="0"/>
+                    </a:p>
+                  </a:txBody>
+                  <a:tcPr marL="91450" marR="91450" marT="45725" marB="45725"/>
+                </a:tc>
+                <a:extLst>
+                  <a:ext uri="{0D108BD9-81ED-4DB2-BD59-A6C34878D82A}">
+                    <a16:rowId xmlns:a16="http://schemas.microsoft.com/office/drawing/2014/main" val="10003"/>
+                  </a:ext>
+                </a:extLst>
+              </a:tr>
+            </a:tbl>
+          </a:graphicData>
+        </a:graphic>
+      </p:graphicFrame>
+      <p:sp>
+        <p:nvSpPr>
+          <p:cNvPr id="224" name="Google Shape;224;p8"/>
+          <p:cNvSpPr txBox="1"/>
+          <p:nvPr/>
+        </p:nvSpPr>
+        <p:spPr>
+          <a:xfrm>
+            <a:off x="1023938" y="593330"/>
+            <a:ext cx="8420100" cy="369291"/>
+          </a:xfrm>
+          <a:prstGeom prst="rect">
+            <a:avLst/>
+          </a:prstGeom>
+          <a:noFill/>
+          <a:ln>
+            <a:noFill/>
+          </a:ln>
+        </p:spPr>
+        <p:txBody>
+          <a:bodyPr spcFirstLastPara="1" wrap="square" lIns="91425" tIns="45700" rIns="91425" bIns="45700" anchor="t" anchorCtr="0">
+            <a:spAutoFit/>
+          </a:bodyPr>
+          <a:lstStyle/>
+          <a:p>
+            <a:pPr marL="0" marR="0" lvl="0" indent="0" algn="l" rtl="0">
+              <a:spcBef>
+                <a:spcPts val="0"/>
+              </a:spcBef>
+              <a:spcAft>
+                <a:spcPts val="0"/>
+              </a:spcAft>
+              <a:buNone/>
+            </a:pPr>
+            <a:r>
+              <a:rPr lang="en-US" sz="1800" dirty="0">
+                <a:solidFill>
+                  <a:schemeClr val="dk1"/>
+                </a:solidFill>
+                <a:latin typeface="Consolas"/>
+                <a:ea typeface="Consolas"/>
+                <a:cs typeface="Consolas"/>
+                <a:sym typeface="Consolas"/>
+              </a:rPr>
+              <a:t>The impact of different sampling rates on time series alignment.</a:t>
+            </a:r>
+            <a:endParaRPr sz="1800" dirty="0">
+              <a:solidFill>
+                <a:schemeClr val="dk1"/>
+              </a:solidFill>
+              <a:latin typeface="Consolas"/>
+              <a:ea typeface="Consolas"/>
+              <a:cs typeface="Consolas"/>
+              <a:sym typeface="Consolas"/>
+            </a:endParaRPr>
+          </a:p>
+        </p:txBody>
+      </p:sp>
+      <p:graphicFrame>
+        <p:nvGraphicFramePr>
+          <p:cNvPr id="2" name="Google Shape;223;p8">
+            <a:extLst>
+              <a:ext uri="{FF2B5EF4-FFF2-40B4-BE49-F238E27FC236}">
+                <a16:creationId xmlns:a16="http://schemas.microsoft.com/office/drawing/2014/main" id="{7DBDC2FF-7D04-9901-C96A-228E909B5F0D}"/>
+              </a:ext>
+            </a:extLst>
+          </p:cNvPr>
+          <p:cNvGraphicFramePr/>
+          <p:nvPr>
+            <p:extLst>
+              <p:ext uri="{D42A27DB-BD31-4B8C-83A1-F6EECF244321}">
+                <p14:modId xmlns:p14="http://schemas.microsoft.com/office/powerpoint/2010/main" val="541158630"/>
+              </p:ext>
+            </p:extLst>
+          </p:nvPr>
+        </p:nvGraphicFramePr>
+        <p:xfrm>
+          <a:off x="1109315" y="1269242"/>
+          <a:ext cx="9369899" cy="1864486"/>
+        </p:xfrm>
+        <a:graphic>
+          <a:graphicData uri="http://schemas.openxmlformats.org/drawingml/2006/table">
+            <a:tbl>
+              <a:tblPr firstRow="1" bandRow="1">
+                <a:noFill/>
+                <a:tableStyleId>{AB4F9DF2-0438-42AD-B170-30067649D97E}</a:tableStyleId>
+              </a:tblPr>
+              <a:tblGrid>
+                <a:gridCol w="2064087">
+                  <a:extLst>
+                    <a:ext uri="{9D8B030D-6E8A-4147-A177-3AD203B41FA5}">
+                      <a16:colId xmlns:a16="http://schemas.microsoft.com/office/drawing/2014/main" val="20000"/>
+                    </a:ext>
+                  </a:extLst>
+                </a:gridCol>
+                <a:gridCol w="1562437">
+                  <a:extLst>
+                    <a:ext uri="{9D8B030D-6E8A-4147-A177-3AD203B41FA5}">
+                      <a16:colId xmlns:a16="http://schemas.microsoft.com/office/drawing/2014/main" val="2274870688"/>
+                    </a:ext>
+                  </a:extLst>
+                </a:gridCol>
+                <a:gridCol w="1938675">
+                  <a:extLst>
+                    <a:ext uri="{9D8B030D-6E8A-4147-A177-3AD203B41FA5}">
+                      <a16:colId xmlns:a16="http://schemas.microsoft.com/office/drawing/2014/main" val="20001"/>
+                    </a:ext>
+                  </a:extLst>
+                </a:gridCol>
+                <a:gridCol w="2189500">
+                  <a:extLst>
+                    <a:ext uri="{9D8B030D-6E8A-4147-A177-3AD203B41FA5}">
+                      <a16:colId xmlns:a16="http://schemas.microsoft.com/office/drawing/2014/main" val="3073676540"/>
+                    </a:ext>
+                  </a:extLst>
+                </a:gridCol>
+                <a:gridCol w="805237">
+                  <a:extLst>
+                    <a:ext uri="{9D8B030D-6E8A-4147-A177-3AD203B41FA5}">
+                      <a16:colId xmlns:a16="http://schemas.microsoft.com/office/drawing/2014/main" val="20002"/>
+                    </a:ext>
+                  </a:extLst>
+                </a:gridCol>
+                <a:gridCol w="809963">
+                  <a:extLst>
+                    <a:ext uri="{9D8B030D-6E8A-4147-A177-3AD203B41FA5}">
+                      <a16:colId xmlns:a16="http://schemas.microsoft.com/office/drawing/2014/main" val="20003"/>
+                    </a:ext>
+                  </a:extLst>
+                </a:gridCol>
+              </a:tblGrid>
+              <a:tr h="381086">
+                <a:tc>
+                  <a:txBody>
+                    <a:bodyPr/>
+                    <a:lstStyle/>
+                    <a:p>
+                      <a:pPr marL="0" marR="0" lvl="0" indent="0" algn="ctr" rtl="0">
+                        <a:spcBef>
+                          <a:spcPts val="0"/>
+                        </a:spcBef>
+                        <a:spcAft>
+                          <a:spcPts val="0"/>
+                        </a:spcAft>
+                        <a:buNone/>
+                      </a:pPr>
+                      <a:r>
+                        <a:rPr lang="en-US" sz="1800" u="none" strike="noStrike" cap="none" dirty="0"/>
+                        <a:t>Model</a:t>
+                      </a:r>
+                      <a:endParaRPr sz="1800" u="none" strike="noStrike" cap="none" dirty="0"/>
+                    </a:p>
+                  </a:txBody>
+                  <a:tcPr marL="91450" marR="91450" marT="45725" marB="45725"/>
+                </a:tc>
+                <a:tc>
+                  <a:txBody>
+                    <a:bodyPr/>
+                    <a:lstStyle/>
+                    <a:p>
+                      <a:pPr marL="0" marR="0" lvl="0" indent="0" algn="ctr" rtl="0">
+                        <a:spcBef>
+                          <a:spcPts val="0"/>
+                        </a:spcBef>
+                        <a:spcAft>
+                          <a:spcPts val="0"/>
+                        </a:spcAft>
+                        <a:buNone/>
+                      </a:pPr>
+                      <a:r>
+                        <a:rPr lang="en-US" sz="1800" u="none" strike="noStrike" cap="none" dirty="0"/>
+                        <a:t>Data</a:t>
+                      </a:r>
+                      <a:endParaRPr sz="1800" u="none" strike="noStrike" cap="none" dirty="0"/>
+                    </a:p>
+                  </a:txBody>
+                  <a:tcPr marL="91450" marR="91450" marT="45725" marB="45725"/>
+                </a:tc>
+                <a:tc>
+                  <a:txBody>
+                    <a:bodyPr/>
+                    <a:lstStyle/>
+                    <a:p>
+                      <a:pPr marL="0" marR="0" lvl="0" indent="0" algn="ctr" rtl="0">
+                        <a:spcBef>
+                          <a:spcPts val="0"/>
+                        </a:spcBef>
+                        <a:spcAft>
+                          <a:spcPts val="0"/>
+                        </a:spcAft>
+                        <a:buNone/>
+                      </a:pPr>
+                      <a:r>
+                        <a:rPr lang="en-US" sz="1800" u="none" strike="noStrike" cap="none" dirty="0"/>
+                        <a:t>Sampling Rate</a:t>
+                      </a:r>
+                      <a:endParaRPr sz="1800" u="none" strike="noStrike" cap="none" dirty="0"/>
+                    </a:p>
+                  </a:txBody>
+                  <a:tcPr marL="91450" marR="91450" marT="45725" marB="45725"/>
+                </a:tc>
+                <a:tc>
+                  <a:txBody>
+                    <a:bodyPr/>
+                    <a:lstStyle/>
+                    <a:p>
+                      <a:pPr marL="0" marR="0" lvl="0" indent="0" algn="ctr" rtl="0">
+                        <a:spcBef>
+                          <a:spcPts val="0"/>
+                        </a:spcBef>
+                        <a:spcAft>
+                          <a:spcPts val="0"/>
+                        </a:spcAft>
+                        <a:buNone/>
+                      </a:pPr>
+                      <a:r>
+                        <a:rPr lang="en-US" sz="1800" u="none" strike="noStrike" cap="none" dirty="0"/>
+                        <a:t>Resample </a:t>
+                      </a:r>
+                      <a:r>
+                        <a:rPr lang="en-US" altLang="zh-CN" sz="1800" u="none" strike="noStrike" cap="none" dirty="0"/>
+                        <a:t>Method</a:t>
+                      </a:r>
+                      <a:endParaRPr sz="1800" u="none" strike="noStrike" cap="none" dirty="0"/>
+                    </a:p>
+                  </a:txBody>
+                  <a:tcPr marL="91450" marR="91450" marT="45725" marB="45725"/>
+                </a:tc>
+                <a:tc>
+                  <a:txBody>
+                    <a:bodyPr/>
+                    <a:lstStyle/>
+                    <a:p>
+                      <a:pPr marL="0" marR="0" lvl="0" indent="0" algn="ctr" rtl="0">
+                        <a:spcBef>
+                          <a:spcPts val="0"/>
+                        </a:spcBef>
+                        <a:spcAft>
+                          <a:spcPts val="0"/>
+                        </a:spcAft>
+                        <a:buNone/>
+                      </a:pPr>
+                      <a:r>
+                        <a:rPr lang="en-US" sz="1800" u="none" strike="noStrike" cap="none" dirty="0"/>
+                        <a:t>S</a:t>
+                      </a:r>
+                      <a:endParaRPr sz="1800" u="none" strike="noStrike" cap="none" dirty="0"/>
+                    </a:p>
+                  </a:txBody>
+                  <a:tcPr marL="91450" marR="91450" marT="45725" marB="45725"/>
+                </a:tc>
+                <a:tc>
+                  <a:txBody>
+                    <a:bodyPr/>
+                    <a:lstStyle/>
+                    <a:p>
+                      <a:pPr marL="0" marR="0" lvl="0" indent="0" algn="ctr" rtl="0">
+                        <a:spcBef>
+                          <a:spcPts val="0"/>
+                        </a:spcBef>
+                        <a:spcAft>
+                          <a:spcPts val="0"/>
+                        </a:spcAft>
+                        <a:buNone/>
+                      </a:pPr>
+                      <a:r>
+                        <a:rPr lang="en-US" sz="1800" u="none" strike="noStrike" cap="none" dirty="0"/>
+                        <a:t>D</a:t>
+                      </a:r>
+                      <a:endParaRPr sz="1800" u="none" strike="noStrike" cap="none" dirty="0"/>
+                    </a:p>
+                  </a:txBody>
+                  <a:tcPr marL="91450" marR="91450" marT="45725" marB="45725"/>
+                </a:tc>
+                <a:extLst>
+                  <a:ext uri="{0D108BD9-81ED-4DB2-BD59-A6C34878D82A}">
+                    <a16:rowId xmlns:a16="http://schemas.microsoft.com/office/drawing/2014/main" val="10000"/>
+                  </a:ext>
+                </a:extLst>
+              </a:tr>
+              <a:tr h="370850">
+                <a:tc>
+                  <a:txBody>
+                    <a:bodyPr/>
+                    <a:lstStyle/>
+                    <a:p>
+                      <a:pPr marL="0" marR="0" lvl="0" indent="0" algn="ctr" rtl="0">
+                        <a:spcBef>
+                          <a:spcPts val="0"/>
+                        </a:spcBef>
+                        <a:spcAft>
+                          <a:spcPts val="0"/>
+                        </a:spcAft>
+                        <a:buNone/>
+                      </a:pPr>
+                      <a:r>
+                        <a:rPr lang="en-US" sz="1800" u="none" strike="noStrike" cap="none" dirty="0"/>
+                        <a:t>Template: Mean</a:t>
+                      </a:r>
+                      <a:endParaRPr dirty="0"/>
+                    </a:p>
+                  </a:txBody>
+                  <a:tcPr marL="91450" marR="91450" marT="45725" marB="45725"/>
+                </a:tc>
+                <a:tc>
+                  <a:txBody>
+                    <a:bodyPr/>
+                    <a:lstStyle/>
+                    <a:p>
+                      <a:pPr marL="0" marR="0" lvl="0" indent="0" algn="ctr" rtl="0">
+                        <a:lnSpc>
+                          <a:spcPct val="100000"/>
+                        </a:lnSpc>
+                        <a:spcBef>
+                          <a:spcPts val="0"/>
+                        </a:spcBef>
+                        <a:spcAft>
+                          <a:spcPts val="0"/>
+                        </a:spcAft>
+                        <a:buClr>
+                          <a:schemeClr val="dk1"/>
+                        </a:buClr>
+                        <a:buSzPts val="1800"/>
+                        <a:buFont typeface="Consolas"/>
+                        <a:buNone/>
+                      </a:pPr>
+                      <a:r>
+                        <a:rPr lang="en-US" sz="1800" u="none" strike="noStrike" cap="none" dirty="0"/>
+                        <a:t>Simulation</a:t>
+                      </a:r>
+                      <a:endParaRPr sz="1800" u="none" strike="noStrike" cap="none" dirty="0"/>
+                    </a:p>
+                  </a:txBody>
+                  <a:tcPr marL="91450" marR="91450" marT="45725" marB="45725"/>
+                </a:tc>
+                <a:tc>
+                  <a:txBody>
+                    <a:bodyPr/>
+                    <a:lstStyle/>
+                    <a:p>
+                      <a:pPr marL="0" marR="0" lvl="0" indent="0" algn="ctr" rtl="0">
+                        <a:lnSpc>
+                          <a:spcPct val="100000"/>
+                        </a:lnSpc>
+                        <a:spcBef>
+                          <a:spcPts val="0"/>
+                        </a:spcBef>
+                        <a:spcAft>
+                          <a:spcPts val="0"/>
+                        </a:spcAft>
+                        <a:buClr>
+                          <a:schemeClr val="dk1"/>
+                        </a:buClr>
+                        <a:buSzPts val="1800"/>
+                        <a:buFont typeface="Consolas"/>
+                        <a:buNone/>
+                      </a:pPr>
+                      <a:r>
+                        <a:rPr lang="en-US" sz="1800" u="none" strike="noStrike" cap="none"/>
+                        <a:t>100</a:t>
+                      </a:r>
+                      <a:endParaRPr sz="1800" u="none" strike="noStrike" cap="none"/>
+                    </a:p>
+                  </a:txBody>
+                  <a:tcPr marL="91450" marR="91450" marT="45725" marB="45725"/>
+                </a:tc>
+                <a:tc>
+                  <a:txBody>
+                    <a:bodyPr/>
+                    <a:lstStyle/>
+                    <a:p>
+                      <a:pPr marL="0" marR="0" lvl="0" indent="0" algn="ctr" rtl="0">
+                        <a:lnSpc>
+                          <a:spcPct val="100000"/>
+                        </a:lnSpc>
+                        <a:spcBef>
+                          <a:spcPts val="0"/>
+                        </a:spcBef>
+                        <a:spcAft>
+                          <a:spcPts val="0"/>
+                        </a:spcAft>
+                        <a:buClr>
+                          <a:schemeClr val="dk1"/>
+                        </a:buClr>
+                        <a:buSzPts val="1800"/>
+                        <a:buFont typeface="Consolas"/>
+                        <a:buNone/>
+                      </a:pPr>
+                      <a:r>
+                        <a:rPr lang="en-US" sz="1800" u="none" strike="noStrike" cap="none" dirty="0"/>
+                        <a:t>-</a:t>
+                      </a:r>
+                      <a:endParaRPr sz="1800" u="none" strike="noStrike" cap="none" dirty="0"/>
+                    </a:p>
+                  </a:txBody>
+                  <a:tcPr marL="91450" marR="91450" marT="45725" marB="45725"/>
+                </a:tc>
+                <a:tc>
+                  <a:txBody>
+                    <a:bodyPr/>
+                    <a:lstStyle/>
+                    <a:p>
+                      <a:pPr marL="0" marR="0" lvl="0" indent="0" algn="ctr" rtl="0">
+                        <a:lnSpc>
+                          <a:spcPct val="100000"/>
+                        </a:lnSpc>
+                        <a:spcBef>
+                          <a:spcPts val="0"/>
+                        </a:spcBef>
+                        <a:spcAft>
+                          <a:spcPts val="0"/>
+                        </a:spcAft>
+                        <a:buClr>
+                          <a:schemeClr val="dk1"/>
+                        </a:buClr>
+                        <a:buSzPts val="1800"/>
+                        <a:buFont typeface="Consolas"/>
+                        <a:buNone/>
+                      </a:pPr>
+                      <a:r>
+                        <a:rPr lang="en-US" sz="1800" u="none" strike="noStrike" cap="none" dirty="0"/>
+                        <a:t>1.35</a:t>
+                      </a:r>
+                      <a:endParaRPr sz="1800" u="none" strike="noStrike" cap="none" dirty="0"/>
+                    </a:p>
+                  </a:txBody>
+                  <a:tcPr marL="91450" marR="91450" marT="45725" marB="45725"/>
+                </a:tc>
+                <a:tc>
+                  <a:txBody>
+                    <a:bodyPr/>
+                    <a:lstStyle/>
+                    <a:p>
+                      <a:pPr marL="0" marR="0" lvl="0" indent="0" algn="ctr" rtl="0">
+                        <a:lnSpc>
+                          <a:spcPct val="100000"/>
+                        </a:lnSpc>
+                        <a:spcBef>
+                          <a:spcPts val="0"/>
+                        </a:spcBef>
+                        <a:spcAft>
+                          <a:spcPts val="0"/>
+                        </a:spcAft>
+                        <a:buClr>
+                          <a:schemeClr val="dk1"/>
+                        </a:buClr>
+                        <a:buSzPts val="1800"/>
+                        <a:buFont typeface="Consolas"/>
+                        <a:buNone/>
+                      </a:pPr>
+                      <a:r>
+                        <a:rPr lang="en-US" sz="1800" u="none" strike="noStrike" cap="none" dirty="0"/>
+                        <a:t>4.53</a:t>
+                      </a:r>
+                      <a:endParaRPr sz="1800" u="none" strike="noStrike" cap="none" dirty="0"/>
+                    </a:p>
+                  </a:txBody>
+                  <a:tcPr marL="91450" marR="91450" marT="45725" marB="45725"/>
+                </a:tc>
+                <a:extLst>
+                  <a:ext uri="{0D108BD9-81ED-4DB2-BD59-A6C34878D82A}">
+                    <a16:rowId xmlns:a16="http://schemas.microsoft.com/office/drawing/2014/main" val="10001"/>
+                  </a:ext>
+                </a:extLst>
+              </a:tr>
+              <a:tr h="370850">
+                <a:tc>
+                  <a:txBody>
+                    <a:bodyPr/>
+                    <a:lstStyle/>
+                    <a:p>
+                      <a:pPr marL="0" marR="0" lvl="0" indent="0" algn="ctr" rtl="0">
+                        <a:spcBef>
+                          <a:spcPts val="0"/>
+                        </a:spcBef>
+                        <a:spcAft>
+                          <a:spcPts val="0"/>
+                        </a:spcAft>
+                        <a:buNone/>
+                      </a:pPr>
+                      <a:r>
+                        <a:rPr lang="en-US" sz="1800" u="none" strike="noStrike" cap="none" dirty="0"/>
+                        <a:t>Template: Mean</a:t>
+                      </a:r>
+                      <a:endParaRPr dirty="0"/>
+                    </a:p>
+                  </a:txBody>
+                  <a:tcPr marL="91450" marR="91450" marT="45725" marB="45725"/>
+                </a:tc>
+                <a:tc>
+                  <a:txBody>
+                    <a:bodyPr/>
+                    <a:lstStyle/>
+                    <a:p>
+                      <a:pPr marL="0" marR="0" lvl="0" indent="0" algn="ctr" rtl="0">
+                        <a:lnSpc>
+                          <a:spcPct val="100000"/>
+                        </a:lnSpc>
+                        <a:spcBef>
+                          <a:spcPts val="0"/>
+                        </a:spcBef>
+                        <a:spcAft>
+                          <a:spcPts val="0"/>
+                        </a:spcAft>
+                        <a:buClr>
+                          <a:schemeClr val="dk1"/>
+                        </a:buClr>
+                        <a:buSzPts val="1800"/>
+                        <a:buFont typeface="Consolas"/>
+                        <a:buNone/>
+                      </a:pPr>
+                      <a:r>
+                        <a:rPr lang="en-US" sz="1800" u="none" strike="noStrike" cap="none" dirty="0"/>
+                        <a:t>Simulation</a:t>
+                      </a:r>
+                      <a:endParaRPr sz="1800" u="none" strike="noStrike" cap="none" dirty="0"/>
+                    </a:p>
+                  </a:txBody>
+                  <a:tcPr marL="91450" marR="91450" marT="45725" marB="45725"/>
+                </a:tc>
+                <a:tc>
+                  <a:txBody>
+                    <a:bodyPr/>
+                    <a:lstStyle/>
+                    <a:p>
                       <a:pPr marL="0" marR="0" lvl="0" indent="0" algn="ctr" rtl="0">
                         <a:lnSpc>
                           <a:spcPct val="100000"/>
@@ -22174,192 +23165,6 @@
                     <a:bodyPr/>
                     <a:lstStyle/>
                     <a:p>
-                      <a:pPr marL="0" marR="0" lvl="0" indent="0" algn="ctr" defTabSz="914400" rtl="0" eaLnBrk="1" fontAlgn="auto" latinLnBrk="0" hangingPunct="1">
-                        <a:lnSpc>
-                          <a:spcPct val="100000"/>
-                        </a:lnSpc>
-                        <a:spcBef>
-                          <a:spcPts val="0"/>
-                        </a:spcBef>
-                        <a:spcAft>
-                          <a:spcPts val="0"/>
-                        </a:spcAft>
-                        <a:buClr>
-                          <a:schemeClr val="dk1"/>
-                        </a:buClr>
-                        <a:buSzPts val="1800"/>
-                        <a:buFont typeface="Consolas"/>
-                        <a:buNone/>
-                        <a:tabLst/>
-                        <a:defRPr/>
-                      </a:pPr>
-                      <a:r>
-                        <a:rPr lang="en-US" altLang="zh-CN" sz="1800" u="none" strike="noStrike" cap="none" dirty="0"/>
-                        <a:t>100-&gt;200</a:t>
-                      </a:r>
-                    </a:p>
-                  </a:txBody>
-                  <a:tcPr marL="91450" marR="91450" marT="45725" marB="45725"/>
-                </a:tc>
-                <a:tc>
-                  <a:txBody>
-                    <a:bodyPr/>
-                    <a:lstStyle/>
-                    <a:p>
-                      <a:pPr marL="0" marR="0" lvl="0" indent="0" algn="ctr" rtl="0">
-                        <a:lnSpc>
-                          <a:spcPct val="100000"/>
-                        </a:lnSpc>
-                        <a:spcBef>
-                          <a:spcPts val="0"/>
-                        </a:spcBef>
-                        <a:spcAft>
-                          <a:spcPts val="0"/>
-                        </a:spcAft>
-                        <a:buClr>
-                          <a:schemeClr val="dk1"/>
-                        </a:buClr>
-                        <a:buSzPts val="1800"/>
-                        <a:buFont typeface="Consolas"/>
-                        <a:buNone/>
-                      </a:pPr>
-                      <a:r>
-                        <a:rPr lang="en-US" sz="1800" u="none" strike="noStrike" cap="none" dirty="0"/>
-                        <a:t>FFT</a:t>
-                      </a:r>
-                      <a:endParaRPr sz="1800" u="none" strike="noStrike" cap="none" dirty="0"/>
-                    </a:p>
-                  </a:txBody>
-                  <a:tcPr marL="91450" marR="91450" marT="45725" marB="45725"/>
-                </a:tc>
-                <a:tc>
-                  <a:txBody>
-                    <a:bodyPr/>
-                    <a:lstStyle/>
-                    <a:p>
-                      <a:pPr marL="0" marR="0" lvl="0" indent="0" algn="ctr" rtl="0">
-                        <a:lnSpc>
-                          <a:spcPct val="100000"/>
-                        </a:lnSpc>
-                        <a:spcBef>
-                          <a:spcPts val="0"/>
-                        </a:spcBef>
-                        <a:spcAft>
-                          <a:spcPts val="0"/>
-                        </a:spcAft>
-                        <a:buClr>
-                          <a:schemeClr val="dk1"/>
-                        </a:buClr>
-                        <a:buSzPts val="1800"/>
-                        <a:buFont typeface="Consolas"/>
-                        <a:buNone/>
-                      </a:pPr>
-                      <a:r>
-                        <a:rPr lang="en-US" sz="1800" u="none" strike="noStrike" cap="none" dirty="0"/>
-                        <a:t>0.70</a:t>
-                      </a:r>
-                      <a:endParaRPr sz="1800" u="none" strike="noStrike" cap="none" dirty="0"/>
-                    </a:p>
-                  </a:txBody>
-                  <a:tcPr marL="91450" marR="91450" marT="45725" marB="45725"/>
-                </a:tc>
-                <a:tc>
-                  <a:txBody>
-                    <a:bodyPr/>
-                    <a:lstStyle/>
-                    <a:p>
-                      <a:pPr marL="0" marR="0" lvl="0" indent="0" algn="ctr" rtl="0">
-                        <a:lnSpc>
-                          <a:spcPct val="100000"/>
-                        </a:lnSpc>
-                        <a:spcBef>
-                          <a:spcPts val="0"/>
-                        </a:spcBef>
-                        <a:spcAft>
-                          <a:spcPts val="0"/>
-                        </a:spcAft>
-                        <a:buClr>
-                          <a:schemeClr val="dk1"/>
-                        </a:buClr>
-                        <a:buSzPts val="1800"/>
-                        <a:buFont typeface="Consolas"/>
-                        <a:buNone/>
-                      </a:pPr>
-                      <a:r>
-                        <a:rPr lang="en-US" sz="1800" u="none" strike="noStrike" cap="none" dirty="0"/>
-                        <a:t>2.47</a:t>
-                      </a:r>
-                      <a:endParaRPr sz="1800" u="none" strike="noStrike" cap="none" dirty="0"/>
-                    </a:p>
-                  </a:txBody>
-                  <a:tcPr marL="91450" marR="91450" marT="45725" marB="45725"/>
-                </a:tc>
-                <a:extLst>
-                  <a:ext uri="{0D108BD9-81ED-4DB2-BD59-A6C34878D82A}">
-                    <a16:rowId xmlns:a16="http://schemas.microsoft.com/office/drawing/2014/main" val="2956886552"/>
-                  </a:ext>
-                </a:extLst>
-              </a:tr>
-              <a:tr h="370850">
-                <a:tc>
-                  <a:txBody>
-                    <a:bodyPr/>
-                    <a:lstStyle/>
-                    <a:p>
-                      <a:pPr marL="0" marR="0" lvl="0" indent="0" algn="ctr" rtl="0">
-                        <a:spcBef>
-                          <a:spcPts val="0"/>
-                        </a:spcBef>
-                        <a:spcAft>
-                          <a:spcPts val="0"/>
-                        </a:spcAft>
-                        <a:buNone/>
-                      </a:pPr>
-                      <a:r>
-                        <a:rPr lang="en-US" sz="1800" u="none" strike="noStrike" cap="none" dirty="0"/>
-                        <a:t>Template: Mean</a:t>
-                      </a:r>
-                      <a:endParaRPr dirty="0"/>
-                    </a:p>
-                  </a:txBody>
-                  <a:tcPr marL="91450" marR="91450" marT="45725" marB="45725"/>
-                </a:tc>
-                <a:tc>
-                  <a:txBody>
-                    <a:bodyPr/>
-                    <a:lstStyle/>
-                    <a:p>
-                      <a:pPr marL="0" marR="0" lvl="0" indent="0" algn="ctr" rtl="0">
-                        <a:lnSpc>
-                          <a:spcPct val="100000"/>
-                        </a:lnSpc>
-                        <a:spcBef>
-                          <a:spcPts val="0"/>
-                        </a:spcBef>
-                        <a:spcAft>
-                          <a:spcPts val="0"/>
-                        </a:spcAft>
-                        <a:buClr>
-                          <a:schemeClr val="dk1"/>
-                        </a:buClr>
-                        <a:buSzPts val="1800"/>
-                        <a:buFont typeface="Consolas"/>
-                        <a:buNone/>
-                      </a:pPr>
-                      <a:r>
-                        <a:rPr lang="en-US" sz="1800" u="none" strike="noStrike" cap="none" dirty="0"/>
-                        <a:t>Simulation</a:t>
-                      </a:r>
-                      <a:endParaRPr sz="1800" u="none" strike="noStrike" cap="none" dirty="0"/>
-                    </a:p>
-                  </a:txBody>
-                  <a:tcPr marL="91450" marR="91450" marT="45725" marB="45725"/>
-                </a:tc>
-                <a:tc>
-                  <a:txBody>
-                    <a:bodyPr/>
-                    <a:lstStyle/>
-                    <a:p>
                       <a:pPr marL="0" marR="0" lvl="0" indent="0" algn="ctr" rtl="0">
                         <a:lnSpc>
                           <a:spcPct val="100000"/>
@@ -22501,192 +23306,6 @@
                         <a:buNone/>
                       </a:pPr>
                       <a:r>
-                        <a:rPr lang="en-US" sz="1800" u="none" strike="noStrike" cap="none" dirty="0"/>
-                        <a:t>Template: Mean</a:t>
-                      </a:r>
-                      <a:endParaRPr dirty="0"/>
-                    </a:p>
-                  </a:txBody>
-                  <a:tcPr marL="91450" marR="91450" marT="45725" marB="45725"/>
-                </a:tc>
-                <a:tc>
-                  <a:txBody>
-                    <a:bodyPr/>
-                    <a:lstStyle/>
-                    <a:p>
-                      <a:pPr marL="0" marR="0" lvl="0" indent="0" algn="ctr" rtl="0">
-                        <a:lnSpc>
-                          <a:spcPct val="100000"/>
-                        </a:lnSpc>
-                        <a:spcBef>
-                          <a:spcPts val="0"/>
-                        </a:spcBef>
-                        <a:spcAft>
-                          <a:spcPts val="0"/>
-                        </a:spcAft>
-                        <a:buClr>
-                          <a:schemeClr val="dk1"/>
-                        </a:buClr>
-                        <a:buSzPts val="1800"/>
-                        <a:buFont typeface="Consolas"/>
-                        <a:buNone/>
-                      </a:pPr>
-                      <a:r>
-                        <a:rPr lang="en-US" sz="1800" u="none" strike="noStrike" cap="none" dirty="0"/>
-                        <a:t>Simulation</a:t>
-                      </a:r>
-                      <a:endParaRPr sz="1800" u="none" strike="noStrike" cap="none" dirty="0"/>
-                    </a:p>
-                  </a:txBody>
-                  <a:tcPr marL="91450" marR="91450" marT="45725" marB="45725"/>
-                </a:tc>
-                <a:tc>
-                  <a:txBody>
-                    <a:bodyPr/>
-                    <a:lstStyle/>
-                    <a:p>
-                      <a:pPr marL="0" marR="0" lvl="0" indent="0" algn="ctr" defTabSz="914400" rtl="0" eaLnBrk="1" fontAlgn="auto" latinLnBrk="0" hangingPunct="1">
-                        <a:lnSpc>
-                          <a:spcPct val="100000"/>
-                        </a:lnSpc>
-                        <a:spcBef>
-                          <a:spcPts val="0"/>
-                        </a:spcBef>
-                        <a:spcAft>
-                          <a:spcPts val="0"/>
-                        </a:spcAft>
-                        <a:buClr>
-                          <a:schemeClr val="dk1"/>
-                        </a:buClr>
-                        <a:buSzPts val="1800"/>
-                        <a:buFont typeface="Consolas"/>
-                        <a:buNone/>
-                        <a:tabLst/>
-                        <a:defRPr/>
-                      </a:pPr>
-                      <a:r>
-                        <a:rPr lang="en-US" altLang="zh-CN" sz="1800" u="none" strike="noStrike" cap="none" dirty="0"/>
-                        <a:t>100-&gt;200</a:t>
-                      </a:r>
-                    </a:p>
-                  </a:txBody>
-                  <a:tcPr marL="91450" marR="91450" marT="45725" marB="45725"/>
-                </a:tc>
-                <a:tc>
-                  <a:txBody>
-                    <a:bodyPr/>
-                    <a:lstStyle/>
-                    <a:p>
-                      <a:pPr marL="0" marR="0" lvl="0" indent="0" algn="ctr" rtl="0">
-                        <a:lnSpc>
-                          <a:spcPct val="100000"/>
-                        </a:lnSpc>
-                        <a:spcBef>
-                          <a:spcPts val="0"/>
-                        </a:spcBef>
-                        <a:spcAft>
-                          <a:spcPts val="0"/>
-                        </a:spcAft>
-                        <a:buClr>
-                          <a:schemeClr val="dk1"/>
-                        </a:buClr>
-                        <a:buSzPts val="1800"/>
-                        <a:buFont typeface="Consolas"/>
-                        <a:buNone/>
-                      </a:pPr>
-                      <a:r>
-                        <a:rPr lang="en-US" sz="1800" u="none" strike="noStrike" cap="none" dirty="0"/>
-                        <a:t>POLY</a:t>
-                      </a:r>
-                      <a:endParaRPr sz="1800" u="none" strike="noStrike" cap="none" dirty="0"/>
-                    </a:p>
-                  </a:txBody>
-                  <a:tcPr marL="91450" marR="91450" marT="45725" marB="45725"/>
-                </a:tc>
-                <a:tc>
-                  <a:txBody>
-                    <a:bodyPr/>
-                    <a:lstStyle/>
-                    <a:p>
-                      <a:pPr marL="0" marR="0" lvl="0" indent="0" algn="ctr" rtl="0">
-                        <a:lnSpc>
-                          <a:spcPct val="100000"/>
-                        </a:lnSpc>
-                        <a:spcBef>
-                          <a:spcPts val="0"/>
-                        </a:spcBef>
-                        <a:spcAft>
-                          <a:spcPts val="0"/>
-                        </a:spcAft>
-                        <a:buClr>
-                          <a:schemeClr val="dk1"/>
-                        </a:buClr>
-                        <a:buSzPts val="1800"/>
-                        <a:buFont typeface="Consolas"/>
-                        <a:buNone/>
-                      </a:pPr>
-                      <a:r>
-                        <a:rPr lang="en-US" sz="1800" u="none" strike="noStrike" cap="none" dirty="0"/>
-                        <a:t>0.64</a:t>
-                      </a:r>
-                      <a:endParaRPr sz="1800" u="none" strike="noStrike" cap="none" dirty="0"/>
-                    </a:p>
-                  </a:txBody>
-                  <a:tcPr marL="91450" marR="91450" marT="45725" marB="45725"/>
-                </a:tc>
-                <a:tc>
-                  <a:txBody>
-                    <a:bodyPr/>
-                    <a:lstStyle/>
-                    <a:p>
-                      <a:pPr marL="0" marR="0" lvl="0" indent="0" algn="ctr" rtl="0">
-                        <a:lnSpc>
-                          <a:spcPct val="100000"/>
-                        </a:lnSpc>
-                        <a:spcBef>
-                          <a:spcPts val="0"/>
-                        </a:spcBef>
-                        <a:spcAft>
-                          <a:spcPts val="0"/>
-                        </a:spcAft>
-                        <a:buClr>
-                          <a:schemeClr val="dk1"/>
-                        </a:buClr>
-                        <a:buSzPts val="1800"/>
-                        <a:buFont typeface="Consolas"/>
-                        <a:buNone/>
-                      </a:pPr>
-                      <a:r>
-                        <a:rPr lang="en-US" sz="1800" u="none" strike="noStrike" cap="none" dirty="0"/>
-                        <a:t>2.07</a:t>
-                      </a:r>
-                      <a:endParaRPr sz="1800" u="none" strike="noStrike" cap="none" dirty="0"/>
-                    </a:p>
-                  </a:txBody>
-                  <a:tcPr marL="91450" marR="91450" marT="45725" marB="45725"/>
-                </a:tc>
-                <a:extLst>
-                  <a:ext uri="{0D108BD9-81ED-4DB2-BD59-A6C34878D82A}">
-                    <a16:rowId xmlns:a16="http://schemas.microsoft.com/office/drawing/2014/main" val="4028608685"/>
-                  </a:ext>
-                </a:extLst>
-              </a:tr>
-              <a:tr h="370850">
-                <a:tc>
-                  <a:txBody>
-                    <a:bodyPr/>
-                    <a:lstStyle/>
-                    <a:p>
-                      <a:pPr marL="0" marR="0" lvl="0" indent="0" algn="ctr" rtl="0">
-                        <a:spcBef>
-                          <a:spcPts val="0"/>
-                        </a:spcBef>
-                        <a:spcAft>
-                          <a:spcPts val="0"/>
-                        </a:spcAft>
-                        <a:buNone/>
-                      </a:pPr>
-                      <a:r>
                         <a:rPr lang="en-US" sz="1800" u="none" strike="noStrike" cap="none"/>
                         <a:t>Template: Mean</a:t>
                       </a:r>
@@ -22779,10 +23398,10 @@
                         <a:buNone/>
                       </a:pPr>
                       <a:r>
-                        <a:rPr lang="en-US" sz="1800" u="none" strike="noStrike" cap="none"/>
+                        <a:rPr lang="en-US" sz="1800" u="none" strike="noStrike" cap="none" dirty="0"/>
                         <a:t>0.92 </a:t>
                       </a:r>
-                      <a:endParaRPr sz="1800" u="none" strike="noStrike" cap="none"/>
+                      <a:endParaRPr sz="1800" u="none" strike="noStrike" cap="none" dirty="0"/>
                     </a:p>
                   </a:txBody>
                   <a:tcPr marL="91450" marR="91450" marT="45725" marB="45725"/>
@@ -22824,210 +23443,73 @@
                   </a:ext>
                 </a:extLst>
               </a:tr>
-              <a:tr h="231823">
-                <a:tc>
-                  <a:txBody>
-                    <a:bodyPr/>
-                    <a:lstStyle/>
-                    <a:p>
-                      <a:pPr marL="0" marR="0" lvl="0" indent="0" algn="ctr" rtl="0">
-                        <a:spcBef>
-                          <a:spcPts val="0"/>
-                        </a:spcBef>
-                        <a:spcAft>
-                          <a:spcPts val="0"/>
-                        </a:spcAft>
-                        <a:buNone/>
-                      </a:pPr>
-                      <a:r>
-                        <a:rPr lang="en-US" sz="1800" u="none" strike="noStrike" cap="none"/>
-                        <a:t>Template: Mean</a:t>
-                      </a:r>
-                      <a:endParaRPr/>
-                    </a:p>
-                  </a:txBody>
-                  <a:tcPr marL="91450" marR="91450" marT="45725" marB="45725"/>
-                </a:tc>
-                <a:tc>
-                  <a:txBody>
-                    <a:bodyPr/>
-                    <a:lstStyle/>
-                    <a:p>
-                      <a:pPr marL="0" marR="0" lvl="0" indent="0" algn="ctr" rtl="0">
-                        <a:spcBef>
-                          <a:spcPts val="0"/>
-                        </a:spcBef>
-                        <a:spcAft>
-                          <a:spcPts val="0"/>
-                        </a:spcAft>
-                        <a:buNone/>
-                      </a:pPr>
-                      <a:r>
-                        <a:rPr lang="en-US" altLang="zh-CN" sz="1800" u="none" strike="noStrike" cap="none" dirty="0"/>
-                        <a:t>Simulation</a:t>
-                      </a:r>
-                      <a:endParaRPr sz="1800" u="none" strike="noStrike" cap="none" dirty="0"/>
-                    </a:p>
-                  </a:txBody>
-                  <a:tcPr marL="91450" marR="91450" marT="45725" marB="45725"/>
-                </a:tc>
-                <a:tc>
-                  <a:txBody>
-                    <a:bodyPr/>
-                    <a:lstStyle/>
-                    <a:p>
-                      <a:pPr marL="0" marR="0" lvl="0" indent="0" algn="ctr" rtl="0">
-                        <a:spcBef>
-                          <a:spcPts val="0"/>
-                        </a:spcBef>
-                        <a:spcAft>
-                          <a:spcPts val="0"/>
-                        </a:spcAft>
-                        <a:buNone/>
-                      </a:pPr>
-                      <a:r>
-                        <a:rPr lang="en-US" sz="1800" u="none" strike="noStrike" cap="none" dirty="0"/>
-                        <a:t>200</a:t>
-                      </a:r>
-                      <a:endParaRPr sz="1800" u="none" strike="noStrike" cap="none" dirty="0"/>
-                    </a:p>
-                  </a:txBody>
-                  <a:tcPr marL="91450" marR="91450" marT="45725" marB="45725"/>
-                </a:tc>
-                <a:tc>
-                  <a:txBody>
-                    <a:bodyPr/>
-                    <a:lstStyle/>
-                    <a:p>
-                      <a:pPr marL="0" marR="0" lvl="0" indent="0" algn="ctr" rtl="0">
-                        <a:spcBef>
-                          <a:spcPts val="0"/>
-                        </a:spcBef>
-                        <a:spcAft>
-                          <a:spcPts val="0"/>
-                        </a:spcAft>
-                        <a:buNone/>
-                      </a:pPr>
-                      <a:r>
-                        <a:rPr lang="en-US" sz="1800" u="none" strike="noStrike" cap="none" dirty="0"/>
-                        <a:t>-</a:t>
-                      </a:r>
-                      <a:endParaRPr sz="1800" u="none" strike="noStrike" cap="none" dirty="0"/>
-                    </a:p>
-                  </a:txBody>
-                  <a:tcPr marL="91450" marR="91450" marT="45725" marB="45725"/>
-                </a:tc>
-                <a:tc>
-                  <a:txBody>
-                    <a:bodyPr/>
-                    <a:lstStyle/>
-                    <a:p>
-                      <a:pPr marL="0" marR="0" lvl="0" indent="0" algn="ctr" rtl="0">
-                        <a:spcBef>
-                          <a:spcPts val="0"/>
-                        </a:spcBef>
-                        <a:spcAft>
-                          <a:spcPts val="0"/>
-                        </a:spcAft>
-                        <a:buNone/>
-                      </a:pPr>
-                      <a:r>
-                        <a:rPr lang="en-US" sz="1800" u="none" strike="noStrike" cap="none"/>
-                        <a:t>0.65</a:t>
-                      </a:r>
-                      <a:endParaRPr sz="1800" u="none" strike="noStrike" cap="none"/>
-                    </a:p>
-                  </a:txBody>
-                  <a:tcPr marL="91450" marR="91450" marT="45725" marB="45725"/>
-                </a:tc>
-                <a:tc>
-                  <a:txBody>
-                    <a:bodyPr/>
-                    <a:lstStyle/>
-                    <a:p>
-                      <a:pPr marL="0" marR="0" lvl="0" indent="0" algn="ctr" rtl="0">
-                        <a:spcBef>
-                          <a:spcPts val="0"/>
-                        </a:spcBef>
-                        <a:spcAft>
-                          <a:spcPts val="0"/>
-                        </a:spcAft>
-                        <a:buNone/>
-                      </a:pPr>
-                      <a:r>
-                        <a:rPr lang="en-US" sz="1800" u="none" strike="noStrike" cap="none" dirty="0"/>
-                        <a:t>1.75</a:t>
-                      </a:r>
-                      <a:endParaRPr sz="1800" u="none" strike="noStrike" cap="none" dirty="0"/>
-                    </a:p>
-                  </a:txBody>
-                  <a:tcPr marL="91450" marR="91450" marT="45725" marB="45725"/>
-                </a:tc>
-                <a:extLst>
-                  <a:ext uri="{0D108BD9-81ED-4DB2-BD59-A6C34878D82A}">
-                    <a16:rowId xmlns:a16="http://schemas.microsoft.com/office/drawing/2014/main" val="10003"/>
-                  </a:ext>
-                </a:extLst>
-              </a:tr>
             </a:tbl>
           </a:graphicData>
         </a:graphic>
       </p:graphicFrame>
       <p:sp>
         <p:nvSpPr>
-          <p:cNvPr id="224" name="Google Shape;224;p8"/>
+          <p:cNvPr id="3" name="文本框 2">
+            <a:extLst>
+              <a:ext uri="{FF2B5EF4-FFF2-40B4-BE49-F238E27FC236}">
+                <a16:creationId xmlns:a16="http://schemas.microsoft.com/office/drawing/2014/main" id="{ADB6A530-F0B8-2322-8EF4-89E68ABC5CA9}"/>
+              </a:ext>
+            </a:extLst>
+          </p:cNvPr>
           <p:cNvSpPr txBox="1"/>
           <p:nvPr/>
         </p:nvSpPr>
         <p:spPr>
           <a:xfrm>
-            <a:off x="609600" y="598181"/>
-            <a:ext cx="8420100" cy="369291"/>
+            <a:off x="835819" y="5372100"/>
+            <a:ext cx="10086975" cy="738664"/>
           </a:xfrm>
           <a:prstGeom prst="rect">
             <a:avLst/>
           </a:prstGeom>
           <a:noFill/>
-          <a:ln>
-            <a:noFill/>
-          </a:ln>
         </p:spPr>
         <p:txBody>
-          <a:bodyPr spcFirstLastPara="1" wrap="square" lIns="91425" tIns="45700" rIns="91425" bIns="45700" anchor="t" anchorCtr="0">
+          <a:bodyPr wrap="square" rtlCol="0">
             <a:spAutoFit/>
           </a:bodyPr>
           <a:lstStyle/>
           <a:p>
-            <a:pPr marL="0" marR="0" lvl="0" indent="0" algn="l" rtl="0">
-              <a:spcBef>
-                <a:spcPts val="0"/>
-              </a:spcBef>
-              <a:spcAft>
-                <a:spcPts val="0"/>
-              </a:spcAft>
-              <a:buNone/>
+            <a:r>
+              <a:rPr lang="en-US" altLang="zh-CN" dirty="0"/>
+              <a:t>Conclusion:</a:t>
+            </a:r>
+          </a:p>
+          <a:p>
+            <a:pPr marL="342900" indent="-342900">
+              <a:buAutoNum type="arabicPeriod"/>
             </a:pPr>
             <a:r>
-              <a:rPr lang="en-US" sz="1800" dirty="0">
-                <a:solidFill>
-                  <a:schemeClr val="dk1"/>
-                </a:solidFill>
-                <a:latin typeface="Consolas"/>
-                <a:ea typeface="Consolas"/>
-                <a:cs typeface="Consolas"/>
-                <a:sym typeface="Consolas"/>
-              </a:rPr>
-              <a:t>The impact of different sampling rates on time series alignment.</a:t>
+              <a:rPr lang="zh-CN" altLang="en-US" dirty="0"/>
+              <a:t>对低采样率的信号重采样，能够大幅度的提升模型效果。一定范围内，采样率越高越好。</a:t>
             </a:r>
-            <a:endParaRPr sz="1800" dirty="0">
-              <a:solidFill>
-                <a:schemeClr val="dk1"/>
-              </a:solidFill>
-              <a:latin typeface="Consolas"/>
-              <a:ea typeface="Consolas"/>
-              <a:cs typeface="Consolas"/>
-              <a:sym typeface="Consolas"/>
-            </a:endParaRPr>
+            <a:endParaRPr lang="en-US" altLang="zh-CN" dirty="0"/>
+          </a:p>
+          <a:p>
+            <a:pPr marL="342900" indent="-342900">
+              <a:buAutoNum type="arabicPeriod"/>
+            </a:pPr>
+            <a:r>
+              <a:rPr lang="zh-CN" altLang="en-US" dirty="0"/>
+              <a:t>重采样模式对结果有重大的影响，</a:t>
+            </a:r>
+            <a:r>
+              <a:rPr lang="en-US" altLang="zh-CN" dirty="0"/>
+              <a:t>FFT</a:t>
+            </a:r>
+            <a:r>
+              <a:rPr lang="zh-CN" altLang="en-US" dirty="0"/>
+              <a:t>和</a:t>
+            </a:r>
+            <a:r>
+              <a:rPr lang="en-US" altLang="zh-CN" dirty="0"/>
+              <a:t>POLY</a:t>
+            </a:r>
           </a:p>
         </p:txBody>
       </p:sp>

</xml_diff>